<commit_message>
Updated Powerpoint and news
</commit_message>
<xml_diff>
--- a/downloads/PowerPoint-Template-and-Titles-Slide.pptx
+++ b/downloads/PowerPoint-Template-and-Titles-Slide.pptx
@@ -7,7 +7,8 @@
   <p:sldIdLst>
     <p:sldId id="256" r:id="rId2"/>
     <p:sldId id="257" r:id="rId3"/>
-    <p:sldId id="258" r:id="rId4"/>
+    <p:sldId id="259" r:id="rId4"/>
+    <p:sldId id="258" r:id="rId5"/>
   </p:sldIdLst>
   <p:sldSz cx="12192000" cy="6858000"/>
   <p:notesSz cx="6858000" cy="9144000"/>
@@ -276,7 +277,7 @@
           <a:p>
             <a:fld id="{7C7CF0C1-9310-414C-9D43-9D17577D97FE}" type="datetimeFigureOut">
               <a:rPr lang="en-AU" smtClean="0"/>
-              <a:t>11/10/2020</a:t>
+              <a:t>1/04/2021</a:t>
             </a:fld>
             <a:endParaRPr lang="en-AU"/>
           </a:p>
@@ -476,7 +477,7 @@
           <a:p>
             <a:fld id="{7C7CF0C1-9310-414C-9D43-9D17577D97FE}" type="datetimeFigureOut">
               <a:rPr lang="en-AU" smtClean="0"/>
-              <a:t>11/10/2020</a:t>
+              <a:t>1/04/2021</a:t>
             </a:fld>
             <a:endParaRPr lang="en-AU"/>
           </a:p>
@@ -686,7 +687,7 @@
           <a:p>
             <a:fld id="{7C7CF0C1-9310-414C-9D43-9D17577D97FE}" type="datetimeFigureOut">
               <a:rPr lang="en-AU" smtClean="0"/>
-              <a:t>11/10/2020</a:t>
+              <a:t>1/04/2021</a:t>
             </a:fld>
             <a:endParaRPr lang="en-AU"/>
           </a:p>
@@ -886,7 +887,7 @@
           <a:p>
             <a:fld id="{7C7CF0C1-9310-414C-9D43-9D17577D97FE}" type="datetimeFigureOut">
               <a:rPr lang="en-AU" smtClean="0"/>
-              <a:t>11/10/2020</a:t>
+              <a:t>1/04/2021</a:t>
             </a:fld>
             <a:endParaRPr lang="en-AU"/>
           </a:p>
@@ -1162,7 +1163,7 @@
           <a:p>
             <a:fld id="{7C7CF0C1-9310-414C-9D43-9D17577D97FE}" type="datetimeFigureOut">
               <a:rPr lang="en-AU" smtClean="0"/>
-              <a:t>11/10/2020</a:t>
+              <a:t>1/04/2021</a:t>
             </a:fld>
             <a:endParaRPr lang="en-AU"/>
           </a:p>
@@ -1430,7 +1431,7 @@
           <a:p>
             <a:fld id="{7C7CF0C1-9310-414C-9D43-9D17577D97FE}" type="datetimeFigureOut">
               <a:rPr lang="en-AU" smtClean="0"/>
-              <a:t>11/10/2020</a:t>
+              <a:t>1/04/2021</a:t>
             </a:fld>
             <a:endParaRPr lang="en-AU"/>
           </a:p>
@@ -1845,7 +1846,7 @@
           <a:p>
             <a:fld id="{7C7CF0C1-9310-414C-9D43-9D17577D97FE}" type="datetimeFigureOut">
               <a:rPr lang="en-AU" smtClean="0"/>
-              <a:t>11/10/2020</a:t>
+              <a:t>1/04/2021</a:t>
             </a:fld>
             <a:endParaRPr lang="en-AU"/>
           </a:p>
@@ -1987,7 +1988,7 @@
           <a:p>
             <a:fld id="{7C7CF0C1-9310-414C-9D43-9D17577D97FE}" type="datetimeFigureOut">
               <a:rPr lang="en-AU" smtClean="0"/>
-              <a:t>11/10/2020</a:t>
+              <a:t>1/04/2021</a:t>
             </a:fld>
             <a:endParaRPr lang="en-AU"/>
           </a:p>
@@ -2100,7 +2101,7 @@
           <a:p>
             <a:fld id="{7C7CF0C1-9310-414C-9D43-9D17577D97FE}" type="datetimeFigureOut">
               <a:rPr lang="en-AU" smtClean="0"/>
-              <a:t>11/10/2020</a:t>
+              <a:t>1/04/2021</a:t>
             </a:fld>
             <a:endParaRPr lang="en-AU"/>
           </a:p>
@@ -2413,7 +2414,7 @@
           <a:p>
             <a:fld id="{7C7CF0C1-9310-414C-9D43-9D17577D97FE}" type="datetimeFigureOut">
               <a:rPr lang="en-AU" smtClean="0"/>
-              <a:t>11/10/2020</a:t>
+              <a:t>1/04/2021</a:t>
             </a:fld>
             <a:endParaRPr lang="en-AU"/>
           </a:p>
@@ -2702,7 +2703,7 @@
           <a:p>
             <a:fld id="{7C7CF0C1-9310-414C-9D43-9D17577D97FE}" type="datetimeFigureOut">
               <a:rPr lang="en-AU" smtClean="0"/>
-              <a:t>11/10/2020</a:t>
+              <a:t>1/04/2021</a:t>
             </a:fld>
             <a:endParaRPr lang="en-AU"/>
           </a:p>
@@ -2981,7 +2982,7 @@
           <a:p>
             <a:fld id="{7C7CF0C1-9310-414C-9D43-9D17577D97FE}" type="datetimeFigureOut">
               <a:rPr lang="en-AU" smtClean="0"/>
-              <a:t>11/10/2020</a:t>
+              <a:t>1/04/2021</a:t>
             </a:fld>
             <a:endParaRPr lang="en-AU"/>
           </a:p>
@@ -3525,6 +3526,78 @@
           </a:bodyPr>
           <a:lstStyle/>
           <a:p>
+            <a:pPr marL="0" indent="0">
+              <a:lnSpc>
+                <a:spcPct val="100000"/>
+              </a:lnSpc>
+              <a:spcBef>
+                <a:spcPts val="0"/>
+              </a:spcBef>
+              <a:buNone/>
+            </a:pPr>
+            <a:r>
+              <a:rPr lang="en-US" sz="3600" b="1" baseline="30000" dirty="0">
+                <a:solidFill>
+                  <a:srgbClr val="639FD5"/>
+                </a:solidFill>
+                <a:latin typeface="Calibri" panose="020F0502020204030204" pitchFamily="34" charset="0"/>
+                <a:cs typeface="Calibri" panose="020F0502020204030204" pitchFamily="34" charset="0"/>
+              </a:rPr>
+              <a:t>Call for Abstracts</a:t>
+            </a:r>
+          </a:p>
+          <a:p>
+            <a:pPr>
+              <a:lnSpc>
+                <a:spcPct val="100000"/>
+              </a:lnSpc>
+              <a:spcBef>
+                <a:spcPts val="0"/>
+              </a:spcBef>
+            </a:pPr>
+            <a:r>
+              <a:rPr lang="en-US" baseline="30000" dirty="0">
+                <a:latin typeface="Calibri" panose="020F0502020204030204" pitchFamily="34" charset="0"/>
+                <a:cs typeface="Calibri" panose="020F0502020204030204" pitchFamily="34" charset="0"/>
+              </a:rPr>
+              <a:t>Now open</a:t>
+            </a:r>
+          </a:p>
+          <a:p>
+            <a:pPr>
+              <a:lnSpc>
+                <a:spcPct val="100000"/>
+              </a:lnSpc>
+              <a:spcBef>
+                <a:spcPts val="0"/>
+              </a:spcBef>
+            </a:pPr>
+            <a:r>
+              <a:rPr lang="en-US" baseline="30000" dirty="0">
+                <a:latin typeface="Calibri" panose="020F0502020204030204" pitchFamily="34" charset="0"/>
+                <a:cs typeface="Calibri" panose="020F0502020204030204" pitchFamily="34" charset="0"/>
+              </a:rPr>
+              <a:t>Closes 30 April 2021</a:t>
+            </a:r>
+          </a:p>
+          <a:p>
+            <a:pPr>
+              <a:lnSpc>
+                <a:spcPct val="100000"/>
+              </a:lnSpc>
+              <a:spcBef>
+                <a:spcPts val="0"/>
+              </a:spcBef>
+            </a:pPr>
+            <a:r>
+              <a:rPr lang="en-US" baseline="30000" dirty="0">
+                <a:latin typeface="Calibri" panose="020F0502020204030204" pitchFamily="34" charset="0"/>
+                <a:cs typeface="Calibri" panose="020F0502020204030204" pitchFamily="34" charset="0"/>
+              </a:rPr>
+              <a:t>Announced August 2021</a:t>
+            </a:r>
+          </a:p>
+          <a:p>
             <a:pPr marL="0" marR="0" indent="0" algn="l" rtl="0">
               <a:lnSpc>
                 <a:spcPct val="100000"/>
@@ -3534,78 +3607,7 @@
               </a:spcBef>
               <a:buNone/>
             </a:pPr>
-            <a:r>
-              <a:rPr lang="en-US" sz="3200" b="1" i="0" u="none" strike="noStrike" baseline="30000" dirty="0">
-                <a:solidFill>
-                  <a:srgbClr val="7FB0DD"/>
-                </a:solidFill>
-                <a:latin typeface="Calibri" panose="020F0502020204030204" pitchFamily="34" charset="0"/>
-                <a:cs typeface="Calibri" panose="020F0502020204030204" pitchFamily="34" charset="0"/>
-              </a:rPr>
-              <a:t>Collaborative International Symposia call </a:t>
-            </a:r>
-          </a:p>
-          <a:p>
-            <a:pPr marR="0" algn="l" rtl="0">
-              <a:lnSpc>
-                <a:spcPct val="100000"/>
-              </a:lnSpc>
-              <a:spcBef>
-                <a:spcPts val="0"/>
-              </a:spcBef>
-            </a:pPr>
-            <a:r>
-              <a:rPr lang="en-US" sz="2400" b="0" i="0" u="none" strike="noStrike" baseline="30000" dirty="0">
-                <a:latin typeface="Calibri" panose="020F0502020204030204" pitchFamily="34" charset="0"/>
-                <a:cs typeface="Calibri" panose="020F0502020204030204" pitchFamily="34" charset="0"/>
-              </a:rPr>
-              <a:t>Now open</a:t>
-            </a:r>
-          </a:p>
-          <a:p>
-            <a:pPr marR="0" algn="l" rtl="0">
-              <a:lnSpc>
-                <a:spcPct val="100000"/>
-              </a:lnSpc>
-              <a:spcBef>
-                <a:spcPts val="0"/>
-              </a:spcBef>
-            </a:pPr>
-            <a:r>
-              <a:rPr lang="en-US" sz="2400" b="0" i="0" u="none" strike="noStrike" baseline="30000" dirty="0">
-                <a:latin typeface="Calibri" panose="020F0502020204030204" pitchFamily="34" charset="0"/>
-                <a:cs typeface="Calibri" panose="020F0502020204030204" pitchFamily="34" charset="0"/>
-              </a:rPr>
-              <a:t>Closes 31st October 2020</a:t>
-            </a:r>
-          </a:p>
-          <a:p>
-            <a:pPr marR="0" algn="l" rtl="0">
-              <a:lnSpc>
-                <a:spcPct val="100000"/>
-              </a:lnSpc>
-              <a:spcBef>
-                <a:spcPts val="0"/>
-              </a:spcBef>
-            </a:pPr>
-            <a:r>
-              <a:rPr lang="en-US" sz="2400" b="0" i="0" u="none" strike="noStrike" baseline="30000" dirty="0">
-                <a:latin typeface="Calibri" panose="020F0502020204030204" pitchFamily="34" charset="0"/>
-                <a:cs typeface="Calibri" panose="020F0502020204030204" pitchFamily="34" charset="0"/>
-              </a:rPr>
-              <a:t>Announced January 2021</a:t>
-            </a:r>
-          </a:p>
-          <a:p>
-            <a:pPr marR="0" algn="l" rtl="0">
-              <a:lnSpc>
-                <a:spcPct val="100000"/>
-              </a:lnSpc>
-              <a:spcBef>
-                <a:spcPts val="0"/>
-              </a:spcBef>
-            </a:pPr>
-            <a:endParaRPr lang="en-US" sz="2400" b="0" i="0" u="none" strike="noStrike" baseline="30000" dirty="0">
+            <a:endParaRPr lang="en-US" b="0" i="0" u="none" strike="noStrike" baseline="30000" dirty="0" smtClean="0">
               <a:latin typeface="Calibri" panose="020F0502020204030204" pitchFamily="34" charset="0"/>
               <a:cs typeface="Calibri" panose="020F0502020204030204" pitchFamily="34" charset="0"/>
             </a:endParaRPr>
@@ -3621,18 +3623,18 @@
               <a:buNone/>
             </a:pPr>
             <a:r>
-              <a:rPr lang="en-US" sz="3200" b="1" baseline="30000" dirty="0">
+              <a:rPr lang="en-US" sz="3600" b="1" baseline="30000" dirty="0">
                 <a:solidFill>
                   <a:srgbClr val="639FD5"/>
                 </a:solidFill>
                 <a:latin typeface="Calibri" panose="020F0502020204030204" pitchFamily="34" charset="0"/>
                 <a:cs typeface="Calibri" panose="020F0502020204030204" pitchFamily="34" charset="0"/>
               </a:rPr>
-              <a:t>Free Paper / Poster /  Instructional Course / Platform Abstract Submission </a:t>
-            </a:r>
-          </a:p>
-          <a:p>
-            <a:pPr marR="0" algn="l" rtl="0">
+              <a:t>Scholarship Applications </a:t>
+            </a:r>
+          </a:p>
+          <a:p>
+            <a:pPr>
               <a:lnSpc>
                 <a:spcPct val="100000"/>
               </a:lnSpc>
@@ -3641,15 +3643,15 @@
               </a:spcBef>
             </a:pPr>
             <a:r>
-              <a:rPr lang="en-US" sz="2400" b="0" i="0" u="none" strike="noStrike" baseline="30000" dirty="0">
-                <a:latin typeface="Calibri" panose="020F0502020204030204" pitchFamily="34" charset="0"/>
-                <a:cs typeface="Calibri" panose="020F0502020204030204" pitchFamily="34" charset="0"/>
-              </a:rPr>
-              <a:t>Open February 2021</a:t>
-            </a:r>
-          </a:p>
-          <a:p>
-            <a:pPr marR="0" algn="l" rtl="0">
+              <a:rPr lang="en-US" baseline="30000" dirty="0">
+                <a:latin typeface="Calibri" panose="020F0502020204030204" pitchFamily="34" charset="0"/>
+                <a:cs typeface="Calibri" panose="020F0502020204030204" pitchFamily="34" charset="0"/>
+              </a:rPr>
+              <a:t>Now open</a:t>
+            </a:r>
+          </a:p>
+          <a:p>
+            <a:pPr>
               <a:lnSpc>
                 <a:spcPct val="100000"/>
               </a:lnSpc>
@@ -3658,15 +3660,15 @@
               </a:spcBef>
             </a:pPr>
             <a:r>
-              <a:rPr lang="en-US" sz="2400" b="0" i="0" u="none" strike="noStrike" baseline="30000" dirty="0">
-                <a:latin typeface="Calibri" panose="020F0502020204030204" pitchFamily="34" charset="0"/>
-                <a:cs typeface="Calibri" panose="020F0502020204030204" pitchFamily="34" charset="0"/>
-              </a:rPr>
-              <a:t>Closes April 2021</a:t>
-            </a:r>
-          </a:p>
-          <a:p>
-            <a:pPr marR="0" algn="l" rtl="0">
+              <a:rPr lang="en-US" baseline="30000" dirty="0">
+                <a:latin typeface="Calibri" panose="020F0502020204030204" pitchFamily="34" charset="0"/>
+                <a:cs typeface="Calibri" panose="020F0502020204030204" pitchFamily="34" charset="0"/>
+              </a:rPr>
+              <a:t>Closes 6 June 2021</a:t>
+            </a:r>
+          </a:p>
+          <a:p>
+            <a:pPr>
               <a:lnSpc>
                 <a:spcPct val="100000"/>
               </a:lnSpc>
@@ -3675,23 +3677,24 @@
               </a:spcBef>
             </a:pPr>
             <a:r>
-              <a:rPr lang="en-US" sz="2400" b="0" i="0" u="none" strike="noStrike" baseline="30000" dirty="0">
-                <a:latin typeface="Calibri" panose="020F0502020204030204" pitchFamily="34" charset="0"/>
-                <a:cs typeface="Calibri" panose="020F0502020204030204" pitchFamily="34" charset="0"/>
-              </a:rPr>
-              <a:t>Notify August 2021</a:t>
-            </a:r>
-          </a:p>
-          <a:p>
-            <a:pPr marR="0" algn="l" rtl="0">
+              <a:rPr lang="en-US" baseline="30000" dirty="0">
+                <a:latin typeface="Calibri" panose="020F0502020204030204" pitchFamily="34" charset="0"/>
+                <a:cs typeface="Calibri" panose="020F0502020204030204" pitchFamily="34" charset="0"/>
+              </a:rPr>
+              <a:t>Announced August 2021</a:t>
+            </a:r>
+          </a:p>
+          <a:p>
+            <a:pPr marL="0" marR="0" indent="0" algn="l" rtl="0">
               <a:lnSpc>
                 <a:spcPct val="100000"/>
               </a:lnSpc>
               <a:spcBef>
                 <a:spcPts val="0"/>
               </a:spcBef>
+              <a:buNone/>
             </a:pPr>
-            <a:endParaRPr lang="en-US" sz="2400" b="0" i="0" u="none" strike="noStrike" baseline="30000" dirty="0">
+            <a:endParaRPr lang="en-US" b="0" i="0" u="none" strike="noStrike" baseline="30000" dirty="0">
               <a:latin typeface="Calibri" panose="020F0502020204030204" pitchFamily="34" charset="0"/>
               <a:cs typeface="Calibri" panose="020F0502020204030204" pitchFamily="34" charset="0"/>
             </a:endParaRPr>
@@ -3707,7 +3710,7 @@
               <a:buNone/>
             </a:pPr>
             <a:r>
-              <a:rPr lang="en-US" sz="3200" b="1" baseline="30000" dirty="0">
+              <a:rPr lang="en-US" sz="3600" b="1" baseline="30000" dirty="0">
                 <a:solidFill>
                   <a:srgbClr val="639FD5"/>
                 </a:solidFill>
@@ -3727,11 +3730,11 @@
               </a:spcBef>
             </a:pPr>
             <a:r>
-              <a:rPr lang="en-US" sz="2400" b="0" i="0" u="none" strike="noStrike" baseline="30000" dirty="0">
-                <a:latin typeface="Calibri" panose="020F0502020204030204" pitchFamily="34" charset="0"/>
-                <a:cs typeface="Calibri" panose="020F0502020204030204" pitchFamily="34" charset="0"/>
-              </a:rPr>
-              <a:t>Open March 2021</a:t>
+              <a:rPr lang="en-US" b="0" i="0" u="none" strike="noStrike" baseline="30000" dirty="0" smtClean="0">
+                <a:latin typeface="Calibri" panose="020F0502020204030204" pitchFamily="34" charset="0"/>
+                <a:cs typeface="Calibri" panose="020F0502020204030204" pitchFamily="34" charset="0"/>
+              </a:rPr>
+              <a:t>Now open</a:t>
             </a:r>
           </a:p>
           <a:p>
@@ -3744,23 +3747,45 @@
               </a:spcBef>
             </a:pPr>
             <a:r>
-              <a:rPr lang="en-US" sz="2400" b="0" i="0" u="none" strike="noStrike" baseline="30000" dirty="0">
-                <a:latin typeface="Calibri" panose="020F0502020204030204" pitchFamily="34" charset="0"/>
-                <a:cs typeface="Calibri" panose="020F0502020204030204" pitchFamily="34" charset="0"/>
-              </a:rPr>
-              <a:t>Early bird closes December 2021</a:t>
-            </a:r>
-          </a:p>
-          <a:p>
-            <a:pPr>
+              <a:rPr lang="en-US" b="0" i="0" u="none" strike="noStrike" baseline="30000" dirty="0" smtClean="0">
+                <a:latin typeface="Calibri" panose="020F0502020204030204" pitchFamily="34" charset="0"/>
+                <a:cs typeface="Calibri" panose="020F0502020204030204" pitchFamily="34" charset="0"/>
+              </a:rPr>
+              <a:t>Early </a:t>
+            </a:r>
+            <a:r>
+              <a:rPr lang="en-US" b="0" i="0" u="none" strike="noStrike" baseline="30000" dirty="0">
+                <a:latin typeface="Calibri" panose="020F0502020204030204" pitchFamily="34" charset="0"/>
+                <a:cs typeface="Calibri" panose="020F0502020204030204" pitchFamily="34" charset="0"/>
+              </a:rPr>
+              <a:t>bird closes </a:t>
+            </a:r>
+            <a:r>
+              <a:rPr lang="en-US" b="0" i="0" u="none" strike="noStrike" baseline="30000" dirty="0" smtClean="0">
+                <a:latin typeface="Calibri" panose="020F0502020204030204" pitchFamily="34" charset="0"/>
+                <a:cs typeface="Calibri" panose="020F0502020204030204" pitchFamily="34" charset="0"/>
+              </a:rPr>
+              <a:t>1 November </a:t>
+            </a:r>
+            <a:r>
+              <a:rPr lang="en-US" b="0" i="0" u="none" strike="noStrike" baseline="30000" dirty="0">
+                <a:latin typeface="Calibri" panose="020F0502020204030204" pitchFamily="34" charset="0"/>
+                <a:cs typeface="Calibri" panose="020F0502020204030204" pitchFamily="34" charset="0"/>
+              </a:rPr>
+              <a:t>2021</a:t>
+            </a:r>
+          </a:p>
+          <a:p>
+            <a:pPr marL="0" indent="0">
               <a:lnSpc>
                 <a:spcPct val="100000"/>
               </a:lnSpc>
               <a:spcBef>
                 <a:spcPts val="0"/>
               </a:spcBef>
+              <a:buNone/>
             </a:pPr>
-            <a:endParaRPr lang="en-US" sz="3200" b="1" baseline="30000" dirty="0">
+            <a:endParaRPr lang="en-US" sz="3600" b="1" baseline="30000" dirty="0">
               <a:latin typeface="Calibri" panose="020F0502020204030204" pitchFamily="34" charset="0"/>
               <a:cs typeface="Calibri" panose="020F0502020204030204" pitchFamily="34" charset="0"/>
             </a:endParaRPr>
@@ -3775,7 +3800,7 @@
               </a:spcBef>
               <a:buNone/>
             </a:pPr>
-            <a:endParaRPr lang="en-US" sz="2400" b="0" i="0" u="none" strike="noStrike" baseline="30000" dirty="0">
+            <a:endParaRPr lang="en-US" b="0" i="0" u="none" strike="noStrike" baseline="30000" dirty="0">
               <a:latin typeface="Calibri" panose="020F0502020204030204" pitchFamily="34" charset="0"/>
               <a:cs typeface="Calibri" panose="020F0502020204030204" pitchFamily="34" charset="0"/>
             </a:endParaRPr>
@@ -3983,79 +4008,7 @@
               </a:spcBef>
               <a:buNone/>
             </a:pPr>
-            <a:r>
-              <a:rPr lang="en-US" sz="3200" b="1" baseline="30000" dirty="0">
-                <a:solidFill>
-                  <a:srgbClr val="639FD5"/>
-                </a:solidFill>
-                <a:latin typeface="Calibri" panose="020F0502020204030204" pitchFamily="34" charset="0"/>
-                <a:cs typeface="Calibri" panose="020F0502020204030204" pitchFamily="34" charset="0"/>
-              </a:rPr>
-              <a:t>Scholarship Applications </a:t>
-            </a:r>
-          </a:p>
-          <a:p>
-            <a:pPr marR="0" algn="l" rtl="0">
-              <a:lnSpc>
-                <a:spcPct val="100000"/>
-              </a:lnSpc>
-              <a:spcBef>
-                <a:spcPts val="0"/>
-              </a:spcBef>
-            </a:pPr>
-            <a:r>
-              <a:rPr lang="en-US" sz="2400" b="0" i="0" u="none" strike="noStrike" baseline="30000" dirty="0">
-                <a:latin typeface="Calibri" panose="020F0502020204030204" pitchFamily="34" charset="0"/>
-                <a:cs typeface="Calibri" panose="020F0502020204030204" pitchFamily="34" charset="0"/>
-              </a:rPr>
-              <a:t>Open February 2021</a:t>
-            </a:r>
-          </a:p>
-          <a:p>
-            <a:pPr marR="0" algn="l" rtl="0">
-              <a:lnSpc>
-                <a:spcPct val="100000"/>
-              </a:lnSpc>
-              <a:spcBef>
-                <a:spcPts val="0"/>
-              </a:spcBef>
-            </a:pPr>
-            <a:r>
-              <a:rPr lang="en-US" sz="2400" b="0" i="0" u="none" strike="noStrike" baseline="30000" dirty="0">
-                <a:latin typeface="Calibri" panose="020F0502020204030204" pitchFamily="34" charset="0"/>
-                <a:cs typeface="Calibri" panose="020F0502020204030204" pitchFamily="34" charset="0"/>
-              </a:rPr>
-              <a:t>Closes April 2021</a:t>
-            </a:r>
-          </a:p>
-          <a:p>
-            <a:pPr marR="0" algn="l" rtl="0">
-              <a:lnSpc>
-                <a:spcPct val="100000"/>
-              </a:lnSpc>
-              <a:spcBef>
-                <a:spcPts val="0"/>
-              </a:spcBef>
-            </a:pPr>
-            <a:r>
-              <a:rPr lang="en-US" sz="2400" b="0" i="0" u="none" strike="noStrike" baseline="30000" dirty="0">
-                <a:latin typeface="Calibri" panose="020F0502020204030204" pitchFamily="34" charset="0"/>
-                <a:cs typeface="Calibri" panose="020F0502020204030204" pitchFamily="34" charset="0"/>
-              </a:rPr>
-              <a:t>Notify August 2021</a:t>
-            </a:r>
-          </a:p>
-          <a:p>
-            <a:pPr marL="0" indent="0">
-              <a:lnSpc>
-                <a:spcPct val="100000"/>
-              </a:lnSpc>
-              <a:spcBef>
-                <a:spcPts val="0"/>
-              </a:spcBef>
-              <a:buNone/>
-            </a:pPr>
-            <a:endParaRPr lang="en-US" sz="3200" b="1" baseline="30000" dirty="0">
+            <a:endParaRPr lang="en-US" sz="3600" b="1" baseline="30000" dirty="0">
               <a:latin typeface="Calibri" panose="020F0502020204030204" pitchFamily="34" charset="0"/>
               <a:cs typeface="Calibri" panose="020F0502020204030204" pitchFamily="34" charset="0"/>
             </a:endParaRPr>
@@ -4071,7 +4024,7 @@
               <a:buNone/>
             </a:pPr>
             <a:r>
-              <a:rPr lang="en-US" sz="3200" b="1" baseline="30000" dirty="0">
+              <a:rPr lang="en-US" sz="3600" b="1" baseline="30000" dirty="0">
                 <a:solidFill>
                   <a:srgbClr val="639FD5"/>
                 </a:solidFill>
@@ -4091,7 +4044,7 @@
               </a:spcBef>
             </a:pPr>
             <a:r>
-              <a:rPr lang="en-US" sz="2400" baseline="30000" dirty="0">
+              <a:rPr lang="en-US" baseline="30000" dirty="0">
                 <a:latin typeface="Calibri" panose="020F0502020204030204" pitchFamily="34" charset="0"/>
                 <a:cs typeface="Calibri" panose="020F0502020204030204" pitchFamily="34" charset="0"/>
               </a:rPr>
@@ -4108,7 +4061,7 @@
               </a:spcBef>
             </a:pPr>
             <a:r>
-              <a:rPr lang="en-US" sz="2400" baseline="30000" dirty="0">
+              <a:rPr lang="en-US" baseline="30000" dirty="0">
                 <a:latin typeface="Calibri" panose="020F0502020204030204" pitchFamily="34" charset="0"/>
                 <a:cs typeface="Calibri" panose="020F0502020204030204" pitchFamily="34" charset="0"/>
               </a:rPr>
@@ -4125,11 +4078,18 @@
               </a:spcBef>
             </a:pPr>
             <a:r>
-              <a:rPr lang="en-US" sz="2400" baseline="30000" dirty="0">
-                <a:latin typeface="Calibri" panose="020F0502020204030204" pitchFamily="34" charset="0"/>
-                <a:cs typeface="Calibri" panose="020F0502020204030204" pitchFamily="34" charset="0"/>
-              </a:rPr>
-              <a:t>Notify January 2022</a:t>
+              <a:rPr lang="en-US" baseline="30000" dirty="0" smtClean="0">
+                <a:latin typeface="Calibri" panose="020F0502020204030204" pitchFamily="34" charset="0"/>
+                <a:cs typeface="Calibri" panose="020F0502020204030204" pitchFamily="34" charset="0"/>
+              </a:rPr>
+              <a:t>Announced January </a:t>
+            </a:r>
+            <a:r>
+              <a:rPr lang="en-US" baseline="30000" dirty="0">
+                <a:latin typeface="Calibri" panose="020F0502020204030204" pitchFamily="34" charset="0"/>
+                <a:cs typeface="Calibri" panose="020F0502020204030204" pitchFamily="34" charset="0"/>
+              </a:rPr>
+              <a:t>2022</a:t>
             </a:r>
           </a:p>
           <a:p>
@@ -4141,7 +4101,7 @@
                 <a:spcPts val="0"/>
               </a:spcBef>
             </a:pPr>
-            <a:endParaRPr lang="en-US" sz="2400" baseline="30000" dirty="0">
+            <a:endParaRPr lang="en-US" baseline="30000" dirty="0">
               <a:latin typeface="Calibri" panose="020F0502020204030204" pitchFamily="34" charset="0"/>
               <a:cs typeface="Calibri" panose="020F0502020204030204" pitchFamily="34" charset="0"/>
             </a:endParaRPr>
@@ -4157,24 +4117,24 @@
               <a:buNone/>
             </a:pPr>
             <a:r>
-              <a:rPr lang="en-US" sz="3200" b="1" baseline="30000" dirty="0" err="1">
+              <a:rPr lang="en-US" sz="3600" b="1" baseline="30000" dirty="0" smtClean="0">
                 <a:solidFill>
                   <a:srgbClr val="639FD5"/>
                 </a:solidFill>
                 <a:latin typeface="Calibri" panose="020F0502020204030204" pitchFamily="34" charset="0"/>
                 <a:cs typeface="Calibri" panose="020F0502020204030204" pitchFamily="34" charset="0"/>
               </a:rPr>
-              <a:t>AusACPDM</a:t>
-            </a:r>
-            <a:r>
-              <a:rPr lang="en-US" sz="3200" b="1" baseline="30000" dirty="0">
+              <a:t>Better Together 2022 </a:t>
+            </a:r>
+            <a:r>
+              <a:rPr lang="en-US" sz="3600" b="1" baseline="30000" dirty="0">
                 <a:solidFill>
                   <a:srgbClr val="639FD5"/>
                 </a:solidFill>
                 <a:latin typeface="Calibri" panose="020F0502020204030204" pitchFamily="34" charset="0"/>
                 <a:cs typeface="Calibri" panose="020F0502020204030204" pitchFamily="34" charset="0"/>
               </a:rPr>
-              <a:t> / IAACD 2022 in Melbourne</a:t>
+              <a:t>in Melbourne</a:t>
             </a:r>
           </a:p>
           <a:p>
@@ -4187,12 +4147,37 @@
               </a:spcBef>
             </a:pPr>
             <a:r>
-              <a:rPr lang="en-US" sz="2400" baseline="30000" dirty="0">
-                <a:latin typeface="Calibri" panose="020F0502020204030204" pitchFamily="34" charset="0"/>
-                <a:cs typeface="Calibri" panose="020F0502020204030204" pitchFamily="34" charset="0"/>
-              </a:rPr>
-              <a:t>28th February, 1st March 2022</a:t>
-            </a:r>
+              <a:rPr lang="en-US" baseline="30000" dirty="0">
+                <a:latin typeface="Calibri" panose="020F0502020204030204" pitchFamily="34" charset="0"/>
+                <a:cs typeface="Calibri" panose="020F0502020204030204" pitchFamily="34" charset="0"/>
+              </a:rPr>
+              <a:t>Pre-Conference</a:t>
+            </a:r>
+            <a:r>
+              <a:rPr lang="en-US" baseline="30000" dirty="0">
+                <a:latin typeface="Calibri" panose="020F0502020204030204" pitchFamily="34" charset="0"/>
+                <a:cs typeface="Calibri" panose="020F0502020204030204" pitchFamily="34" charset="0"/>
+              </a:rPr>
+              <a:t> </a:t>
+            </a:r>
+            <a:r>
+              <a:rPr lang="en-US" baseline="30000" dirty="0" smtClean="0">
+                <a:latin typeface="Calibri" panose="020F0502020204030204" pitchFamily="34" charset="0"/>
+                <a:cs typeface="Calibri" panose="020F0502020204030204" pitchFamily="34" charset="0"/>
+              </a:rPr>
+              <a:t>Sessions; </a:t>
+            </a:r>
+            <a:r>
+              <a:rPr lang="en-US" baseline="30000" dirty="0">
+                <a:latin typeface="Calibri" panose="020F0502020204030204" pitchFamily="34" charset="0"/>
+                <a:cs typeface="Calibri" panose="020F0502020204030204" pitchFamily="34" charset="0"/>
+              </a:rPr>
+              <a:t>1 – 2 March 2022</a:t>
+            </a:r>
+            <a:endParaRPr lang="en-US" baseline="30000" dirty="0">
+              <a:latin typeface="Calibri" panose="020F0502020204030204" pitchFamily="34" charset="0"/>
+              <a:cs typeface="Calibri" panose="020F0502020204030204" pitchFamily="34" charset="0"/>
+            </a:endParaRPr>
           </a:p>
           <a:p>
             <a:pPr>
@@ -4204,23 +4189,13 @@
               </a:spcBef>
             </a:pPr>
             <a:r>
-              <a:rPr lang="en-US" sz="2400" baseline="30000" dirty="0">
-                <a:latin typeface="Calibri" panose="020F0502020204030204" pitchFamily="34" charset="0"/>
-                <a:cs typeface="Calibri" panose="020F0502020204030204" pitchFamily="34" charset="0"/>
-              </a:rPr>
-              <a:t>2nd March - 5th March, 2022</a:t>
-            </a:r>
-          </a:p>
-          <a:p>
-            <a:pPr>
-              <a:lnSpc>
-                <a:spcPct val="100000"/>
-              </a:lnSpc>
-              <a:spcBef>
-                <a:spcPts val="0"/>
-              </a:spcBef>
-            </a:pPr>
-            <a:endParaRPr lang="en-AU" sz="3200" dirty="0">
+              <a:rPr lang="en-US" baseline="30000" dirty="0" smtClean="0">
+                <a:latin typeface="Calibri" panose="020F0502020204030204" pitchFamily="34" charset="0"/>
+                <a:cs typeface="Calibri" panose="020F0502020204030204" pitchFamily="34" charset="0"/>
+              </a:rPr>
+              <a:t>Conference dates; 2 -  5 March 2022</a:t>
+            </a:r>
+            <a:endParaRPr lang="en-US" baseline="30000" dirty="0">
               <a:latin typeface="Calibri" panose="020F0502020204030204" pitchFamily="34" charset="0"/>
               <a:cs typeface="Calibri" panose="020F0502020204030204" pitchFamily="34" charset="0"/>
             </a:endParaRPr>
@@ -4241,6 +4216,1003 @@
 </file>
 
 <file path=ppt/slides/slide3.xml><?xml version="1.0" encoding="utf-8"?>
+<p:sld xmlns:a="http://schemas.openxmlformats.org/drawingml/2006/main" xmlns:r="http://schemas.openxmlformats.org/officeDocument/2006/relationships" xmlns:p="http://schemas.openxmlformats.org/presentationml/2006/main">
+  <p:cSld>
+    <p:spTree>
+      <p:nvGrpSpPr>
+        <p:cNvPr id="1" name=""/>
+        <p:cNvGrpSpPr/>
+        <p:nvPr/>
+      </p:nvGrpSpPr>
+      <p:grpSpPr>
+        <a:xfrm>
+          <a:off x="0" y="0"/>
+          <a:ext cx="0" cy="0"/>
+          <a:chOff x="0" y="0"/>
+          <a:chExt cx="0" cy="0"/>
+        </a:xfrm>
+      </p:grpSpPr>
+      <p:sp>
+        <p:nvSpPr>
+          <p:cNvPr id="2" name="Title 1">
+            <a:extLst>
+              <a:ext uri="{FF2B5EF4-FFF2-40B4-BE49-F238E27FC236}">
+                <a16:creationId xmlns:a16="http://schemas.microsoft.com/office/drawing/2014/main" id="{E70E4E5C-8390-428C-B3F6-39E52994B18D}"/>
+              </a:ext>
+            </a:extLst>
+          </p:cNvPr>
+          <p:cNvSpPr>
+            <a:spLocks noGrp="1"/>
+          </p:cNvSpPr>
+          <p:nvPr>
+            <p:ph type="title"/>
+          </p:nvPr>
+        </p:nvSpPr>
+        <p:spPr>
+          <a:xfrm>
+            <a:off x="434051" y="365125"/>
+            <a:ext cx="11323898" cy="1016181"/>
+          </a:xfrm>
+        </p:spPr>
+        <p:txBody>
+          <a:bodyPr/>
+          <a:lstStyle/>
+          <a:p>
+            <a:r>
+              <a:rPr lang="en-AU" dirty="0" smtClean="0"/>
+              <a:t>Keynote Speakers</a:t>
+            </a:r>
+            <a:endParaRPr lang="en-AU" dirty="0"/>
+          </a:p>
+        </p:txBody>
+      </p:sp>
+      <p:sp>
+        <p:nvSpPr>
+          <p:cNvPr id="3" name="Content Placeholder 2">
+            <a:extLst>
+              <a:ext uri="{FF2B5EF4-FFF2-40B4-BE49-F238E27FC236}">
+                <a16:creationId xmlns:a16="http://schemas.microsoft.com/office/drawing/2014/main" id="{B7D44D11-B8DE-4B16-A49C-7BD40AF01DD3}"/>
+              </a:ext>
+            </a:extLst>
+          </p:cNvPr>
+          <p:cNvSpPr>
+            <a:spLocks noGrp="1"/>
+          </p:cNvSpPr>
+          <p:nvPr>
+            <p:ph idx="1"/>
+          </p:nvPr>
+        </p:nvSpPr>
+        <p:spPr>
+          <a:xfrm>
+            <a:off x="434051" y="1381306"/>
+            <a:ext cx="5081470" cy="4709264"/>
+          </a:xfrm>
+        </p:spPr>
+        <p:txBody>
+          <a:bodyPr>
+            <a:noAutofit/>
+          </a:bodyPr>
+          <a:lstStyle/>
+          <a:p>
+            <a:pPr marL="0" indent="0">
+              <a:lnSpc>
+                <a:spcPct val="100000"/>
+              </a:lnSpc>
+              <a:spcBef>
+                <a:spcPts val="0"/>
+              </a:spcBef>
+              <a:buNone/>
+            </a:pPr>
+            <a:r>
+              <a:rPr lang="en-US" sz="3600" b="1" baseline="30000" dirty="0" smtClean="0">
+                <a:solidFill>
+                  <a:srgbClr val="639FD5"/>
+                </a:solidFill>
+                <a:latin typeface="Calibri" panose="020F0502020204030204" pitchFamily="34" charset="0"/>
+                <a:cs typeface="Calibri" panose="020F0502020204030204" pitchFamily="34" charset="0"/>
+              </a:rPr>
+              <a:t>Prof Petra S. </a:t>
+            </a:r>
+            <a:r>
+              <a:rPr lang="en-US" sz="3600" b="1" baseline="30000" dirty="0" err="1" smtClean="0">
+                <a:solidFill>
+                  <a:srgbClr val="639FD5"/>
+                </a:solidFill>
+                <a:latin typeface="Calibri" panose="020F0502020204030204" pitchFamily="34" charset="0"/>
+                <a:cs typeface="Calibri" panose="020F0502020204030204" pitchFamily="34" charset="0"/>
+              </a:rPr>
+              <a:t>Huppi</a:t>
+            </a:r>
+            <a:r>
+              <a:rPr lang="en-US" sz="3600" b="1" baseline="30000" dirty="0" smtClean="0">
+                <a:solidFill>
+                  <a:srgbClr val="639FD5"/>
+                </a:solidFill>
+                <a:latin typeface="Calibri" panose="020F0502020204030204" pitchFamily="34" charset="0"/>
+                <a:cs typeface="Calibri" panose="020F0502020204030204" pitchFamily="34" charset="0"/>
+              </a:rPr>
+              <a:t> </a:t>
+            </a:r>
+          </a:p>
+          <a:p>
+            <a:pPr marL="0" indent="0">
+              <a:lnSpc>
+                <a:spcPct val="100000"/>
+              </a:lnSpc>
+              <a:spcBef>
+                <a:spcPts val="0"/>
+              </a:spcBef>
+              <a:buNone/>
+            </a:pPr>
+            <a:r>
+              <a:rPr lang="en-US" baseline="30000" dirty="0" smtClean="0">
+                <a:latin typeface="Calibri" panose="020F0502020204030204" pitchFamily="34" charset="0"/>
+                <a:cs typeface="Calibri" panose="020F0502020204030204" pitchFamily="34" charset="0"/>
+              </a:rPr>
+              <a:t>Switzerland</a:t>
+            </a:r>
+            <a:endParaRPr lang="en-US" baseline="30000" dirty="0">
+              <a:latin typeface="Calibri" panose="020F0502020204030204" pitchFamily="34" charset="0"/>
+              <a:cs typeface="Calibri" panose="020F0502020204030204" pitchFamily="34" charset="0"/>
+            </a:endParaRPr>
+          </a:p>
+          <a:p>
+            <a:pPr marL="0" indent="0">
+              <a:lnSpc>
+                <a:spcPct val="100000"/>
+              </a:lnSpc>
+              <a:spcBef>
+                <a:spcPts val="0"/>
+              </a:spcBef>
+              <a:buNone/>
+            </a:pPr>
+            <a:endParaRPr lang="en-US" sz="2000" b="1" baseline="30000" dirty="0" smtClean="0">
+              <a:solidFill>
+                <a:srgbClr val="639FD5"/>
+              </a:solidFill>
+              <a:latin typeface="Calibri" panose="020F0502020204030204" pitchFamily="34" charset="0"/>
+              <a:cs typeface="Calibri" panose="020F0502020204030204" pitchFamily="34" charset="0"/>
+            </a:endParaRPr>
+          </a:p>
+          <a:p>
+            <a:pPr marL="0" indent="0">
+              <a:lnSpc>
+                <a:spcPct val="100000"/>
+              </a:lnSpc>
+              <a:spcBef>
+                <a:spcPts val="0"/>
+              </a:spcBef>
+              <a:buNone/>
+            </a:pPr>
+            <a:r>
+              <a:rPr lang="en-US" sz="3600" b="1" baseline="30000" dirty="0" smtClean="0">
+                <a:solidFill>
+                  <a:srgbClr val="639FD5"/>
+                </a:solidFill>
+                <a:latin typeface="Calibri" panose="020F0502020204030204" pitchFamily="34" charset="0"/>
+                <a:cs typeface="Calibri" panose="020F0502020204030204" pitchFamily="34" charset="0"/>
+              </a:rPr>
+              <a:t>Prof </a:t>
+            </a:r>
+            <a:r>
+              <a:rPr lang="en-US" sz="3600" b="1" baseline="30000" dirty="0" err="1" smtClean="0">
+                <a:solidFill>
+                  <a:srgbClr val="639FD5"/>
+                </a:solidFill>
+                <a:latin typeface="Calibri" panose="020F0502020204030204" pitchFamily="34" charset="0"/>
+                <a:cs typeface="Calibri" panose="020F0502020204030204" pitchFamily="34" charset="0"/>
+              </a:rPr>
+              <a:t>Gulam</a:t>
+            </a:r>
+            <a:r>
+              <a:rPr lang="en-US" sz="3600" b="1" baseline="30000" dirty="0" smtClean="0">
+                <a:solidFill>
+                  <a:srgbClr val="639FD5"/>
+                </a:solidFill>
+                <a:latin typeface="Calibri" panose="020F0502020204030204" pitchFamily="34" charset="0"/>
+                <a:cs typeface="Calibri" panose="020F0502020204030204" pitchFamily="34" charset="0"/>
+              </a:rPr>
+              <a:t> </a:t>
+            </a:r>
+            <a:r>
+              <a:rPr lang="en-US" sz="3600" b="1" baseline="30000" dirty="0" err="1" smtClean="0">
+                <a:solidFill>
+                  <a:srgbClr val="639FD5"/>
+                </a:solidFill>
+                <a:latin typeface="Calibri" panose="020F0502020204030204" pitchFamily="34" charset="0"/>
+                <a:cs typeface="Calibri" panose="020F0502020204030204" pitchFamily="34" charset="0"/>
+              </a:rPr>
+              <a:t>Khandaker</a:t>
+            </a:r>
+            <a:r>
+              <a:rPr lang="en-US" sz="3600" b="1" baseline="30000" dirty="0" smtClean="0">
+                <a:solidFill>
+                  <a:srgbClr val="639FD5"/>
+                </a:solidFill>
+                <a:latin typeface="Calibri" panose="020F0502020204030204" pitchFamily="34" charset="0"/>
+                <a:cs typeface="Calibri" panose="020F0502020204030204" pitchFamily="34" charset="0"/>
+              </a:rPr>
+              <a:t> </a:t>
+            </a:r>
+          </a:p>
+          <a:p>
+            <a:pPr marL="0" indent="0">
+              <a:lnSpc>
+                <a:spcPct val="100000"/>
+              </a:lnSpc>
+              <a:spcBef>
+                <a:spcPts val="0"/>
+              </a:spcBef>
+              <a:buNone/>
+            </a:pPr>
+            <a:r>
+              <a:rPr lang="en-US" baseline="30000" dirty="0" smtClean="0">
+                <a:latin typeface="Calibri" panose="020F0502020204030204" pitchFamily="34" charset="0"/>
+                <a:cs typeface="Calibri" panose="020F0502020204030204" pitchFamily="34" charset="0"/>
+              </a:rPr>
+              <a:t>Australia</a:t>
+            </a:r>
+            <a:endParaRPr lang="en-US" baseline="30000" dirty="0">
+              <a:latin typeface="Calibri" panose="020F0502020204030204" pitchFamily="34" charset="0"/>
+              <a:cs typeface="Calibri" panose="020F0502020204030204" pitchFamily="34" charset="0"/>
+            </a:endParaRPr>
+          </a:p>
+          <a:p>
+            <a:pPr marL="0" indent="0">
+              <a:lnSpc>
+                <a:spcPct val="100000"/>
+              </a:lnSpc>
+              <a:spcBef>
+                <a:spcPts val="0"/>
+              </a:spcBef>
+              <a:buNone/>
+            </a:pPr>
+            <a:endParaRPr lang="en-US" sz="2000" b="1" baseline="30000" dirty="0" smtClean="0">
+              <a:solidFill>
+                <a:srgbClr val="639FD5"/>
+              </a:solidFill>
+              <a:latin typeface="Calibri" panose="020F0502020204030204" pitchFamily="34" charset="0"/>
+              <a:cs typeface="Calibri" panose="020F0502020204030204" pitchFamily="34" charset="0"/>
+            </a:endParaRPr>
+          </a:p>
+          <a:p>
+            <a:pPr marL="0" indent="0">
+              <a:lnSpc>
+                <a:spcPct val="100000"/>
+              </a:lnSpc>
+              <a:spcBef>
+                <a:spcPts val="0"/>
+              </a:spcBef>
+              <a:buNone/>
+            </a:pPr>
+            <a:r>
+              <a:rPr lang="en-US" sz="3600" b="1" baseline="30000" dirty="0" smtClean="0">
+                <a:solidFill>
+                  <a:srgbClr val="639FD5"/>
+                </a:solidFill>
+                <a:latin typeface="Calibri" panose="020F0502020204030204" pitchFamily="34" charset="0"/>
+                <a:cs typeface="Calibri" panose="020F0502020204030204" pitchFamily="34" charset="0"/>
+              </a:rPr>
+              <a:t>Prof Gillian King </a:t>
+            </a:r>
+          </a:p>
+          <a:p>
+            <a:pPr marL="0" indent="0">
+              <a:lnSpc>
+                <a:spcPct val="100000"/>
+              </a:lnSpc>
+              <a:spcBef>
+                <a:spcPts val="0"/>
+              </a:spcBef>
+              <a:buNone/>
+            </a:pPr>
+            <a:r>
+              <a:rPr lang="en-US" baseline="30000" dirty="0" smtClean="0">
+                <a:latin typeface="Calibri" panose="020F0502020204030204" pitchFamily="34" charset="0"/>
+                <a:cs typeface="Calibri" panose="020F0502020204030204" pitchFamily="34" charset="0"/>
+              </a:rPr>
+              <a:t>Canada</a:t>
+            </a:r>
+            <a:endParaRPr lang="en-US" baseline="30000" dirty="0">
+              <a:latin typeface="Calibri" panose="020F0502020204030204" pitchFamily="34" charset="0"/>
+              <a:cs typeface="Calibri" panose="020F0502020204030204" pitchFamily="34" charset="0"/>
+            </a:endParaRPr>
+          </a:p>
+          <a:p>
+            <a:pPr marL="0" indent="0">
+              <a:lnSpc>
+                <a:spcPct val="100000"/>
+              </a:lnSpc>
+              <a:spcBef>
+                <a:spcPts val="0"/>
+              </a:spcBef>
+              <a:buNone/>
+            </a:pPr>
+            <a:endParaRPr lang="en-US" sz="2000" b="1" baseline="30000" dirty="0" smtClean="0">
+              <a:solidFill>
+                <a:srgbClr val="639FD5"/>
+              </a:solidFill>
+              <a:latin typeface="Calibri" panose="020F0502020204030204" pitchFamily="34" charset="0"/>
+              <a:cs typeface="Calibri" panose="020F0502020204030204" pitchFamily="34" charset="0"/>
+            </a:endParaRPr>
+          </a:p>
+          <a:p>
+            <a:pPr marL="0" indent="0">
+              <a:lnSpc>
+                <a:spcPct val="100000"/>
+              </a:lnSpc>
+              <a:spcBef>
+                <a:spcPts val="0"/>
+              </a:spcBef>
+              <a:buNone/>
+            </a:pPr>
+            <a:r>
+              <a:rPr lang="en-US" sz="3600" b="1" baseline="30000" dirty="0" smtClean="0">
+                <a:solidFill>
+                  <a:srgbClr val="639FD5"/>
+                </a:solidFill>
+                <a:latin typeface="Calibri" panose="020F0502020204030204" pitchFamily="34" charset="0"/>
+                <a:cs typeface="Calibri" panose="020F0502020204030204" pitchFamily="34" charset="0"/>
+              </a:rPr>
+              <a:t>Prof Rick Lieber </a:t>
+            </a:r>
+          </a:p>
+          <a:p>
+            <a:pPr marL="0" indent="0">
+              <a:lnSpc>
+                <a:spcPct val="100000"/>
+              </a:lnSpc>
+              <a:spcBef>
+                <a:spcPts val="0"/>
+              </a:spcBef>
+              <a:buNone/>
+            </a:pPr>
+            <a:r>
+              <a:rPr lang="en-US" baseline="30000" dirty="0" smtClean="0">
+                <a:latin typeface="Calibri" panose="020F0502020204030204" pitchFamily="34" charset="0"/>
+                <a:cs typeface="Calibri" panose="020F0502020204030204" pitchFamily="34" charset="0"/>
+              </a:rPr>
+              <a:t>USA</a:t>
+            </a:r>
+            <a:endParaRPr lang="en-US" baseline="30000" dirty="0">
+              <a:latin typeface="Calibri" panose="020F0502020204030204" pitchFamily="34" charset="0"/>
+              <a:cs typeface="Calibri" panose="020F0502020204030204" pitchFamily="34" charset="0"/>
+            </a:endParaRPr>
+          </a:p>
+          <a:p>
+            <a:pPr marL="0" indent="0">
+              <a:lnSpc>
+                <a:spcPct val="100000"/>
+              </a:lnSpc>
+              <a:spcBef>
+                <a:spcPts val="0"/>
+              </a:spcBef>
+              <a:buNone/>
+            </a:pPr>
+            <a:endParaRPr lang="en-US" sz="2000" b="1" baseline="30000" dirty="0" smtClean="0">
+              <a:solidFill>
+                <a:srgbClr val="639FD5"/>
+              </a:solidFill>
+              <a:latin typeface="Calibri" panose="020F0502020204030204" pitchFamily="34" charset="0"/>
+              <a:cs typeface="Calibri" panose="020F0502020204030204" pitchFamily="34" charset="0"/>
+            </a:endParaRPr>
+          </a:p>
+          <a:p>
+            <a:pPr marL="0" indent="0">
+              <a:lnSpc>
+                <a:spcPct val="100000"/>
+              </a:lnSpc>
+              <a:spcBef>
+                <a:spcPts val="0"/>
+              </a:spcBef>
+              <a:buNone/>
+            </a:pPr>
+            <a:r>
+              <a:rPr lang="en-US" sz="3600" b="1" baseline="30000" dirty="0" smtClean="0">
+                <a:solidFill>
+                  <a:srgbClr val="639FD5"/>
+                </a:solidFill>
+                <a:latin typeface="Calibri" panose="020F0502020204030204" pitchFamily="34" charset="0"/>
+                <a:cs typeface="Calibri" panose="020F0502020204030204" pitchFamily="34" charset="0"/>
+              </a:rPr>
+              <a:t>Prof Susan Michie </a:t>
+            </a:r>
+          </a:p>
+          <a:p>
+            <a:pPr marL="0" indent="0">
+              <a:lnSpc>
+                <a:spcPct val="100000"/>
+              </a:lnSpc>
+              <a:spcBef>
+                <a:spcPts val="0"/>
+              </a:spcBef>
+              <a:buNone/>
+            </a:pPr>
+            <a:r>
+              <a:rPr lang="en-US" baseline="30000" dirty="0" smtClean="0">
+                <a:latin typeface="Calibri" panose="020F0502020204030204" pitchFamily="34" charset="0"/>
+                <a:cs typeface="Calibri" panose="020F0502020204030204" pitchFamily="34" charset="0"/>
+              </a:rPr>
+              <a:t>United Kingdom</a:t>
+            </a:r>
+            <a:endParaRPr lang="en-US" baseline="30000" dirty="0">
+              <a:latin typeface="Calibri" panose="020F0502020204030204" pitchFamily="34" charset="0"/>
+              <a:cs typeface="Calibri" panose="020F0502020204030204" pitchFamily="34" charset="0"/>
+            </a:endParaRPr>
+          </a:p>
+        </p:txBody>
+      </p:sp>
+      <p:sp>
+        <p:nvSpPr>
+          <p:cNvPr id="4" name="Content Placeholder 2">
+            <a:extLst>
+              <a:ext uri="{FF2B5EF4-FFF2-40B4-BE49-F238E27FC236}">
+                <a16:creationId xmlns:a16="http://schemas.microsoft.com/office/drawing/2014/main" id="{689C8384-C792-4616-A9E5-6EB4C48D76CD}"/>
+              </a:ext>
+            </a:extLst>
+          </p:cNvPr>
+          <p:cNvSpPr txBox="1">
+            <a:spLocks/>
+          </p:cNvSpPr>
+          <p:nvPr/>
+        </p:nvSpPr>
+        <p:spPr>
+          <a:xfrm>
+            <a:off x="6026257" y="1381306"/>
+            <a:ext cx="5081470" cy="4709264"/>
+          </a:xfrm>
+          <a:prstGeom prst="rect">
+            <a:avLst/>
+          </a:prstGeom>
+        </p:spPr>
+        <p:txBody>
+          <a:bodyPr vert="horz" lIns="91440" tIns="45720" rIns="91440" bIns="45720" rtlCol="0">
+            <a:noAutofit/>
+          </a:bodyPr>
+          <a:lstStyle>
+            <a:lvl1pPr marL="228600" indent="-228600" algn="l" defTabSz="914400" rtl="0" eaLnBrk="1" latinLnBrk="0" hangingPunct="1">
+              <a:lnSpc>
+                <a:spcPct val="90000"/>
+              </a:lnSpc>
+              <a:spcBef>
+                <a:spcPts val="1000"/>
+              </a:spcBef>
+              <a:buFont typeface="Arial" panose="020B0604020202020204" pitchFamily="34" charset="0"/>
+              <a:buChar char="•"/>
+              <a:defRPr sz="2800" kern="1200" spc="-110" baseline="0">
+                <a:solidFill>
+                  <a:schemeClr val="bg1"/>
+                </a:solidFill>
+                <a:latin typeface="+mn-lt"/>
+                <a:ea typeface="+mn-ea"/>
+                <a:cs typeface="+mn-cs"/>
+              </a:defRPr>
+            </a:lvl1pPr>
+            <a:lvl2pPr marL="685800" indent="-228600" algn="l" defTabSz="914400" rtl="0" eaLnBrk="1" latinLnBrk="0" hangingPunct="1">
+              <a:lnSpc>
+                <a:spcPct val="90000"/>
+              </a:lnSpc>
+              <a:spcBef>
+                <a:spcPts val="500"/>
+              </a:spcBef>
+              <a:buFont typeface="Arial" panose="020B0604020202020204" pitchFamily="34" charset="0"/>
+              <a:buChar char="•"/>
+              <a:defRPr sz="2400" kern="1200" spc="-110" baseline="0">
+                <a:solidFill>
+                  <a:schemeClr val="bg1"/>
+                </a:solidFill>
+                <a:latin typeface="+mn-lt"/>
+                <a:ea typeface="+mn-ea"/>
+                <a:cs typeface="+mn-cs"/>
+              </a:defRPr>
+            </a:lvl2pPr>
+            <a:lvl3pPr marL="1143000" indent="-228600" algn="l" defTabSz="914400" rtl="0" eaLnBrk="1" latinLnBrk="0" hangingPunct="1">
+              <a:lnSpc>
+                <a:spcPct val="90000"/>
+              </a:lnSpc>
+              <a:spcBef>
+                <a:spcPts val="500"/>
+              </a:spcBef>
+              <a:buFont typeface="Arial" panose="020B0604020202020204" pitchFamily="34" charset="0"/>
+              <a:buChar char="•"/>
+              <a:defRPr sz="2000" kern="1200" spc="-110" baseline="0">
+                <a:solidFill>
+                  <a:schemeClr val="bg1"/>
+                </a:solidFill>
+                <a:latin typeface="+mn-lt"/>
+                <a:ea typeface="+mn-ea"/>
+                <a:cs typeface="+mn-cs"/>
+              </a:defRPr>
+            </a:lvl3pPr>
+            <a:lvl4pPr marL="1600200" indent="-228600" algn="l" defTabSz="914400" rtl="0" eaLnBrk="1" latinLnBrk="0" hangingPunct="1">
+              <a:lnSpc>
+                <a:spcPct val="90000"/>
+              </a:lnSpc>
+              <a:spcBef>
+                <a:spcPts val="500"/>
+              </a:spcBef>
+              <a:buFont typeface="Arial" panose="020B0604020202020204" pitchFamily="34" charset="0"/>
+              <a:buChar char="•"/>
+              <a:defRPr sz="1800" kern="1200" spc="-110" baseline="0">
+                <a:solidFill>
+                  <a:schemeClr val="bg1"/>
+                </a:solidFill>
+                <a:latin typeface="+mn-lt"/>
+                <a:ea typeface="+mn-ea"/>
+                <a:cs typeface="+mn-cs"/>
+              </a:defRPr>
+            </a:lvl4pPr>
+            <a:lvl5pPr marL="2057400" indent="-228600" algn="l" defTabSz="914400" rtl="0" eaLnBrk="1" latinLnBrk="0" hangingPunct="1">
+              <a:lnSpc>
+                <a:spcPct val="90000"/>
+              </a:lnSpc>
+              <a:spcBef>
+                <a:spcPts val="500"/>
+              </a:spcBef>
+              <a:buFont typeface="Arial" panose="020B0604020202020204" pitchFamily="34" charset="0"/>
+              <a:buChar char="•"/>
+              <a:defRPr sz="1800" kern="1200" spc="-110" baseline="0">
+                <a:solidFill>
+                  <a:schemeClr val="bg1"/>
+                </a:solidFill>
+                <a:latin typeface="+mn-lt"/>
+                <a:ea typeface="+mn-ea"/>
+                <a:cs typeface="+mn-cs"/>
+              </a:defRPr>
+            </a:lvl5pPr>
+            <a:lvl6pPr marL="2514600" indent="-228600" algn="l" defTabSz="914400" rtl="0" eaLnBrk="1" latinLnBrk="0" hangingPunct="1">
+              <a:lnSpc>
+                <a:spcPct val="90000"/>
+              </a:lnSpc>
+              <a:spcBef>
+                <a:spcPts val="500"/>
+              </a:spcBef>
+              <a:buFont typeface="Arial" panose="020B0604020202020204" pitchFamily="34" charset="0"/>
+              <a:buChar char="•"/>
+              <a:defRPr sz="1800" kern="1200">
+                <a:solidFill>
+                  <a:schemeClr val="tx1"/>
+                </a:solidFill>
+                <a:latin typeface="+mn-lt"/>
+                <a:ea typeface="+mn-ea"/>
+                <a:cs typeface="+mn-cs"/>
+              </a:defRPr>
+            </a:lvl6pPr>
+            <a:lvl7pPr marL="2971800" indent="-228600" algn="l" defTabSz="914400" rtl="0" eaLnBrk="1" latinLnBrk="0" hangingPunct="1">
+              <a:lnSpc>
+                <a:spcPct val="90000"/>
+              </a:lnSpc>
+              <a:spcBef>
+                <a:spcPts val="500"/>
+              </a:spcBef>
+              <a:buFont typeface="Arial" panose="020B0604020202020204" pitchFamily="34" charset="0"/>
+              <a:buChar char="•"/>
+              <a:defRPr sz="1800" kern="1200">
+                <a:solidFill>
+                  <a:schemeClr val="tx1"/>
+                </a:solidFill>
+                <a:latin typeface="+mn-lt"/>
+                <a:ea typeface="+mn-ea"/>
+                <a:cs typeface="+mn-cs"/>
+              </a:defRPr>
+            </a:lvl7pPr>
+            <a:lvl8pPr marL="3429000" indent="-228600" algn="l" defTabSz="914400" rtl="0" eaLnBrk="1" latinLnBrk="0" hangingPunct="1">
+              <a:lnSpc>
+                <a:spcPct val="90000"/>
+              </a:lnSpc>
+              <a:spcBef>
+                <a:spcPts val="500"/>
+              </a:spcBef>
+              <a:buFont typeface="Arial" panose="020B0604020202020204" pitchFamily="34" charset="0"/>
+              <a:buChar char="•"/>
+              <a:defRPr sz="1800" kern="1200">
+                <a:solidFill>
+                  <a:schemeClr val="tx1"/>
+                </a:solidFill>
+                <a:latin typeface="+mn-lt"/>
+                <a:ea typeface="+mn-ea"/>
+                <a:cs typeface="+mn-cs"/>
+              </a:defRPr>
+            </a:lvl8pPr>
+            <a:lvl9pPr marL="3886200" indent="-228600" algn="l" defTabSz="914400" rtl="0" eaLnBrk="1" latinLnBrk="0" hangingPunct="1">
+              <a:lnSpc>
+                <a:spcPct val="90000"/>
+              </a:lnSpc>
+              <a:spcBef>
+                <a:spcPts val="500"/>
+              </a:spcBef>
+              <a:buFont typeface="Arial" panose="020B0604020202020204" pitchFamily="34" charset="0"/>
+              <a:buChar char="•"/>
+              <a:defRPr sz="1800" kern="1200">
+                <a:solidFill>
+                  <a:schemeClr val="tx1"/>
+                </a:solidFill>
+                <a:latin typeface="+mn-lt"/>
+                <a:ea typeface="+mn-ea"/>
+                <a:cs typeface="+mn-cs"/>
+              </a:defRPr>
+            </a:lvl9pPr>
+          </a:lstStyle>
+          <a:p>
+            <a:pPr marL="0" indent="0">
+              <a:lnSpc>
+                <a:spcPct val="100000"/>
+              </a:lnSpc>
+              <a:spcBef>
+                <a:spcPts val="0"/>
+              </a:spcBef>
+              <a:buNone/>
+            </a:pPr>
+            <a:r>
+              <a:rPr lang="en-US" sz="3600" b="1" baseline="30000" dirty="0">
+                <a:solidFill>
+                  <a:srgbClr val="639FD5"/>
+                </a:solidFill>
+                <a:latin typeface="Calibri" panose="020F0502020204030204" pitchFamily="34" charset="0"/>
+                <a:cs typeface="Calibri" panose="020F0502020204030204" pitchFamily="34" charset="0"/>
+              </a:rPr>
+              <a:t>Prof Suzanne Miller </a:t>
+            </a:r>
+            <a:endParaRPr lang="en-US" sz="3600" b="1" baseline="30000" dirty="0">
+              <a:solidFill>
+                <a:srgbClr val="639FD5"/>
+              </a:solidFill>
+              <a:latin typeface="Calibri" panose="020F0502020204030204" pitchFamily="34" charset="0"/>
+              <a:cs typeface="Calibri" panose="020F0502020204030204" pitchFamily="34" charset="0"/>
+            </a:endParaRPr>
+          </a:p>
+          <a:p>
+            <a:pPr marL="0" indent="0">
+              <a:lnSpc>
+                <a:spcPct val="100000"/>
+              </a:lnSpc>
+              <a:spcBef>
+                <a:spcPts val="0"/>
+              </a:spcBef>
+              <a:buNone/>
+            </a:pPr>
+            <a:r>
+              <a:rPr lang="en-US" baseline="30000" dirty="0">
+                <a:latin typeface="Calibri" panose="020F0502020204030204" pitchFamily="34" charset="0"/>
+                <a:cs typeface="Calibri" panose="020F0502020204030204" pitchFamily="34" charset="0"/>
+              </a:rPr>
+              <a:t>Australia</a:t>
+            </a:r>
+            <a:endParaRPr lang="en-US" baseline="30000" dirty="0">
+              <a:latin typeface="Calibri" panose="020F0502020204030204" pitchFamily="34" charset="0"/>
+              <a:cs typeface="Calibri" panose="020F0502020204030204" pitchFamily="34" charset="0"/>
+            </a:endParaRPr>
+          </a:p>
+          <a:p>
+            <a:pPr marL="0" indent="0">
+              <a:lnSpc>
+                <a:spcPct val="100000"/>
+              </a:lnSpc>
+              <a:spcBef>
+                <a:spcPts val="0"/>
+              </a:spcBef>
+              <a:buNone/>
+            </a:pPr>
+            <a:endParaRPr lang="en-US" sz="2000" b="1" baseline="30000" dirty="0" smtClean="0">
+              <a:solidFill>
+                <a:srgbClr val="639FD5"/>
+              </a:solidFill>
+              <a:latin typeface="Calibri" panose="020F0502020204030204" pitchFamily="34" charset="0"/>
+              <a:cs typeface="Calibri" panose="020F0502020204030204" pitchFamily="34" charset="0"/>
+            </a:endParaRPr>
+          </a:p>
+          <a:p>
+            <a:pPr marL="0" indent="0">
+              <a:lnSpc>
+                <a:spcPct val="100000"/>
+              </a:lnSpc>
+              <a:spcBef>
+                <a:spcPts val="0"/>
+              </a:spcBef>
+              <a:buNone/>
+            </a:pPr>
+            <a:r>
+              <a:rPr lang="en-US" sz="3600" b="1" baseline="30000" dirty="0">
+                <a:solidFill>
+                  <a:srgbClr val="639FD5"/>
+                </a:solidFill>
+                <a:latin typeface="Calibri" panose="020F0502020204030204" pitchFamily="34" charset="0"/>
+                <a:cs typeface="Calibri" panose="020F0502020204030204" pitchFamily="34" charset="0"/>
+              </a:rPr>
+              <a:t>Dr </a:t>
+            </a:r>
+            <a:r>
+              <a:rPr lang="en-US" sz="3600" b="1" baseline="30000" dirty="0">
+                <a:solidFill>
+                  <a:srgbClr val="639FD5"/>
+                </a:solidFill>
+                <a:latin typeface="Calibri" panose="020F0502020204030204" pitchFamily="34" charset="0"/>
+                <a:cs typeface="Calibri" panose="020F0502020204030204" pitchFamily="34" charset="0"/>
+              </a:rPr>
+              <a:t>Steve </a:t>
+            </a:r>
+            <a:r>
+              <a:rPr lang="en-US" sz="3600" b="1" baseline="30000" dirty="0">
+                <a:solidFill>
+                  <a:srgbClr val="639FD5"/>
+                </a:solidFill>
+                <a:latin typeface="Calibri" panose="020F0502020204030204" pitchFamily="34" charset="0"/>
+                <a:cs typeface="Calibri" panose="020F0502020204030204" pitchFamily="34" charset="0"/>
+              </a:rPr>
+              <a:t>O’Flaherty</a:t>
+            </a:r>
+            <a:endParaRPr lang="en-US" sz="3600" b="1" baseline="30000" dirty="0">
+              <a:solidFill>
+                <a:srgbClr val="639FD5"/>
+              </a:solidFill>
+              <a:latin typeface="Calibri" panose="020F0502020204030204" pitchFamily="34" charset="0"/>
+              <a:cs typeface="Calibri" panose="020F0502020204030204" pitchFamily="34" charset="0"/>
+            </a:endParaRPr>
+          </a:p>
+          <a:p>
+            <a:pPr marL="0" indent="0">
+              <a:lnSpc>
+                <a:spcPct val="100000"/>
+              </a:lnSpc>
+              <a:spcBef>
+                <a:spcPts val="0"/>
+              </a:spcBef>
+              <a:buNone/>
+            </a:pPr>
+            <a:r>
+              <a:rPr lang="en-US" baseline="30000" dirty="0">
+                <a:latin typeface="Calibri" panose="020F0502020204030204" pitchFamily="34" charset="0"/>
+                <a:cs typeface="Calibri" panose="020F0502020204030204" pitchFamily="34" charset="0"/>
+              </a:rPr>
+              <a:t>Australia</a:t>
+            </a:r>
+            <a:endParaRPr lang="en-US" baseline="30000" dirty="0">
+              <a:latin typeface="Calibri" panose="020F0502020204030204" pitchFamily="34" charset="0"/>
+              <a:cs typeface="Calibri" panose="020F0502020204030204" pitchFamily="34" charset="0"/>
+            </a:endParaRPr>
+          </a:p>
+          <a:p>
+            <a:pPr marL="0" indent="0">
+              <a:lnSpc>
+                <a:spcPct val="100000"/>
+              </a:lnSpc>
+              <a:spcBef>
+                <a:spcPts val="0"/>
+              </a:spcBef>
+              <a:buNone/>
+            </a:pPr>
+            <a:endParaRPr lang="en-US" sz="2000" b="1" baseline="30000" dirty="0" smtClean="0">
+              <a:solidFill>
+                <a:srgbClr val="639FD5"/>
+              </a:solidFill>
+              <a:latin typeface="Calibri" panose="020F0502020204030204" pitchFamily="34" charset="0"/>
+              <a:cs typeface="Calibri" panose="020F0502020204030204" pitchFamily="34" charset="0"/>
+            </a:endParaRPr>
+          </a:p>
+          <a:p>
+            <a:pPr marL="0" indent="0">
+              <a:lnSpc>
+                <a:spcPct val="100000"/>
+              </a:lnSpc>
+              <a:spcBef>
+                <a:spcPts val="0"/>
+              </a:spcBef>
+              <a:buNone/>
+            </a:pPr>
+            <a:r>
+              <a:rPr lang="en-US" sz="3600" b="1" baseline="30000" dirty="0">
+                <a:solidFill>
+                  <a:srgbClr val="639FD5"/>
+                </a:solidFill>
+                <a:latin typeface="Calibri" panose="020F0502020204030204" pitchFamily="34" charset="0"/>
+                <a:cs typeface="Calibri" panose="020F0502020204030204" pitchFamily="34" charset="0"/>
+              </a:rPr>
+              <a:t>Dr </a:t>
+            </a:r>
+            <a:r>
+              <a:rPr lang="en-US" sz="3600" b="1" baseline="30000" dirty="0">
+                <a:solidFill>
+                  <a:srgbClr val="639FD5"/>
+                </a:solidFill>
+                <a:latin typeface="Calibri" panose="020F0502020204030204" pitchFamily="34" charset="0"/>
+                <a:cs typeface="Calibri" panose="020F0502020204030204" pitchFamily="34" charset="0"/>
+              </a:rPr>
+              <a:t>Rupal </a:t>
+            </a:r>
+            <a:r>
+              <a:rPr lang="en-US" sz="3600" b="1" baseline="30000" dirty="0">
+                <a:solidFill>
+                  <a:srgbClr val="639FD5"/>
+                </a:solidFill>
+                <a:latin typeface="Calibri" panose="020F0502020204030204" pitchFamily="34" charset="0"/>
+                <a:cs typeface="Calibri" panose="020F0502020204030204" pitchFamily="34" charset="0"/>
+              </a:rPr>
+              <a:t>Patel</a:t>
+            </a:r>
+          </a:p>
+          <a:p>
+            <a:pPr marL="0" indent="0">
+              <a:lnSpc>
+                <a:spcPct val="100000"/>
+              </a:lnSpc>
+              <a:spcBef>
+                <a:spcPts val="0"/>
+              </a:spcBef>
+              <a:buNone/>
+            </a:pPr>
+            <a:r>
+              <a:rPr lang="en-US" baseline="30000" dirty="0">
+                <a:latin typeface="Calibri" panose="020F0502020204030204" pitchFamily="34" charset="0"/>
+                <a:cs typeface="Calibri" panose="020F0502020204030204" pitchFamily="34" charset="0"/>
+              </a:rPr>
+              <a:t>USA</a:t>
+            </a:r>
+          </a:p>
+          <a:p>
+            <a:pPr marL="0" indent="0">
+              <a:lnSpc>
+                <a:spcPct val="100000"/>
+              </a:lnSpc>
+              <a:spcBef>
+                <a:spcPts val="0"/>
+              </a:spcBef>
+              <a:buNone/>
+            </a:pPr>
+            <a:endParaRPr lang="en-US" sz="1400" baseline="30000" dirty="0">
+              <a:latin typeface="Calibri" panose="020F0502020204030204" pitchFamily="34" charset="0"/>
+              <a:cs typeface="Calibri" panose="020F0502020204030204" pitchFamily="34" charset="0"/>
+            </a:endParaRPr>
+          </a:p>
+          <a:p>
+            <a:pPr marL="0" indent="0">
+              <a:lnSpc>
+                <a:spcPct val="100000"/>
+              </a:lnSpc>
+              <a:spcBef>
+                <a:spcPts val="0"/>
+              </a:spcBef>
+              <a:buNone/>
+            </a:pPr>
+            <a:r>
+              <a:rPr lang="en-US" sz="3600" b="1" baseline="30000" dirty="0">
+                <a:solidFill>
+                  <a:srgbClr val="639FD5"/>
+                </a:solidFill>
+                <a:latin typeface="Calibri" panose="020F0502020204030204" pitchFamily="34" charset="0"/>
+                <a:cs typeface="Calibri" panose="020F0502020204030204" pitchFamily="34" charset="0"/>
+              </a:rPr>
+              <a:t>A/Prof Mark </a:t>
+            </a:r>
+            <a:r>
+              <a:rPr lang="en-US" sz="3600" b="1" baseline="30000" dirty="0" smtClean="0">
+                <a:solidFill>
+                  <a:srgbClr val="639FD5"/>
+                </a:solidFill>
+                <a:latin typeface="Calibri" panose="020F0502020204030204" pitchFamily="34" charset="0"/>
+                <a:cs typeface="Calibri" panose="020F0502020204030204" pitchFamily="34" charset="0"/>
+              </a:rPr>
+              <a:t>Peterson</a:t>
+            </a:r>
+            <a:r>
+              <a:rPr lang="en-US" sz="3600" b="1" dirty="0" smtClean="0">
+                <a:solidFill>
+                  <a:srgbClr val="639FD5"/>
+                </a:solidFill>
+                <a:latin typeface="Calibri" panose="020F0502020204030204" pitchFamily="34" charset="0"/>
+                <a:cs typeface="Calibri" panose="020F0502020204030204" pitchFamily="34" charset="0"/>
+              </a:rPr>
+              <a:t> </a:t>
+            </a:r>
+          </a:p>
+          <a:p>
+            <a:pPr marL="0" indent="0">
+              <a:lnSpc>
+                <a:spcPct val="100000"/>
+              </a:lnSpc>
+              <a:spcBef>
+                <a:spcPts val="0"/>
+              </a:spcBef>
+              <a:buNone/>
+            </a:pPr>
+            <a:r>
+              <a:rPr lang="en-US" baseline="30000" dirty="0" smtClean="0">
+                <a:latin typeface="Calibri" panose="020F0502020204030204" pitchFamily="34" charset="0"/>
+                <a:cs typeface="Calibri" panose="020F0502020204030204" pitchFamily="34" charset="0"/>
+              </a:rPr>
+              <a:t>USA</a:t>
+            </a:r>
+          </a:p>
+          <a:p>
+            <a:pPr marL="0" indent="0">
+              <a:lnSpc>
+                <a:spcPct val="100000"/>
+              </a:lnSpc>
+              <a:spcBef>
+                <a:spcPts val="0"/>
+              </a:spcBef>
+              <a:buNone/>
+            </a:pPr>
+            <a:endParaRPr lang="en-US" sz="2000" baseline="30000" dirty="0">
+              <a:latin typeface="Calibri" panose="020F0502020204030204" pitchFamily="34" charset="0"/>
+              <a:cs typeface="Calibri" panose="020F0502020204030204" pitchFamily="34" charset="0"/>
+            </a:endParaRPr>
+          </a:p>
+          <a:p>
+            <a:pPr marL="0" indent="0">
+              <a:lnSpc>
+                <a:spcPct val="100000"/>
+              </a:lnSpc>
+              <a:spcBef>
+                <a:spcPts val="0"/>
+              </a:spcBef>
+              <a:buNone/>
+            </a:pPr>
+            <a:r>
+              <a:rPr lang="en-US" sz="3600" b="1" baseline="30000" dirty="0">
+                <a:solidFill>
+                  <a:srgbClr val="639FD5"/>
+                </a:solidFill>
+                <a:latin typeface="Calibri" panose="020F0502020204030204" pitchFamily="34" charset="0"/>
+                <a:cs typeface="Calibri" panose="020F0502020204030204" pitchFamily="34" charset="0"/>
+              </a:rPr>
+              <a:t>Prof Tom </a:t>
+            </a:r>
+            <a:r>
+              <a:rPr lang="en-US" sz="3600" b="1" baseline="30000" dirty="0" smtClean="0">
+                <a:solidFill>
+                  <a:srgbClr val="639FD5"/>
+                </a:solidFill>
+                <a:latin typeface="Calibri" panose="020F0502020204030204" pitchFamily="34" charset="0"/>
+                <a:cs typeface="Calibri" panose="020F0502020204030204" pitchFamily="34" charset="0"/>
+              </a:rPr>
+              <a:t>Shakespeare </a:t>
+            </a:r>
+          </a:p>
+          <a:p>
+            <a:pPr marL="0" indent="0">
+              <a:lnSpc>
+                <a:spcPct val="100000"/>
+              </a:lnSpc>
+              <a:spcBef>
+                <a:spcPts val="0"/>
+              </a:spcBef>
+              <a:buNone/>
+            </a:pPr>
+            <a:r>
+              <a:rPr lang="en-US" baseline="30000" dirty="0" smtClean="0">
+                <a:latin typeface="Calibri" panose="020F0502020204030204" pitchFamily="34" charset="0"/>
+                <a:cs typeface="Calibri" panose="020F0502020204030204" pitchFamily="34" charset="0"/>
+              </a:rPr>
+              <a:t>United </a:t>
+            </a:r>
+            <a:r>
+              <a:rPr lang="en-US" baseline="30000" dirty="0">
+                <a:latin typeface="Calibri" panose="020F0502020204030204" pitchFamily="34" charset="0"/>
+                <a:cs typeface="Calibri" panose="020F0502020204030204" pitchFamily="34" charset="0"/>
+              </a:rPr>
+              <a:t>Kingdom</a:t>
+            </a:r>
+            <a:endParaRPr lang="en-US" baseline="30000" dirty="0">
+              <a:latin typeface="Calibri" panose="020F0502020204030204" pitchFamily="34" charset="0"/>
+              <a:cs typeface="Calibri" panose="020F0502020204030204" pitchFamily="34" charset="0"/>
+            </a:endParaRPr>
+          </a:p>
+        </p:txBody>
+      </p:sp>
+    </p:spTree>
+    <p:extLst>
+      <p:ext uri="{BB962C8B-B14F-4D97-AF65-F5344CB8AC3E}">
+        <p14:creationId xmlns:p14="http://schemas.microsoft.com/office/powerpoint/2010/main" val="143768008"/>
+      </p:ext>
+    </p:extLst>
+  </p:cSld>
+  <p:clrMapOvr>
+    <a:masterClrMapping/>
+  </p:clrMapOvr>
+</p:sld>
+</file>
+
+<file path=ppt/slides/slide4.xml><?xml version="1.0" encoding="utf-8"?>
 <p:sld xmlns:a="http://schemas.openxmlformats.org/drawingml/2006/main" xmlns:r="http://schemas.openxmlformats.org/officeDocument/2006/relationships" xmlns:p="http://schemas.openxmlformats.org/presentationml/2006/main">
   <p:cSld>
     <p:spTree>

</xml_diff>